<commit_message>
Update to ImGui Display and Docs
</commit_message>
<xml_diff>
--- a/Docs/Milestone1.pptx
+++ b/Docs/Milestone1.pptx
@@ -11,8 +11,10 @@
     <p:sldId id="262" r:id="rId5"/>
     <p:sldId id="263" r:id="rId6"/>
     <p:sldId id="264" r:id="rId7"/>
-    <p:sldId id="265" r:id="rId8"/>
-    <p:sldId id="266" r:id="rId9"/>
+    <p:sldId id="268" r:id="rId8"/>
+    <p:sldId id="269" r:id="rId9"/>
+    <p:sldId id="265" r:id="rId10"/>
+    <p:sldId id="266" r:id="rId11"/>
   </p:sldIdLst>
   <p:sldSz cx="9144000" cy="6858000" type="screen4x3"/>
   <p:notesSz cx="6858000" cy="9144000"/>
@@ -111,6 +113,11 @@
       </a:defRPr>
     </a:lvl9pPr>
   </p:defaultTextStyle>
+  <p:extLst>
+    <p:ext uri="{EFAFB233-063F-42B5-8137-9DF3F51BA10A}">
+      <p15:sldGuideLst xmlns:p15="http://schemas.microsoft.com/office/powerpoint/2012/main"/>
+    </p:ext>
+  </p:extLst>
 </p:presentation>
 </file>
 
@@ -249,7 +256,7 @@
           <a:p>
             <a:fld id="{4560DE88-381B-4B33-8E95-473F64105440}" type="datetimeFigureOut">
               <a:rPr lang="en-US" smtClean="0"/>
-              <a:t>10/4/2017</a:t>
+              <a:t>2/9/2018</a:t>
             </a:fld>
             <a:endParaRPr lang="en-US"/>
           </a:p>
@@ -419,7 +426,7 @@
           <a:p>
             <a:fld id="{4560DE88-381B-4B33-8E95-473F64105440}" type="datetimeFigureOut">
               <a:rPr lang="en-US" smtClean="0"/>
-              <a:t>10/4/2017</a:t>
+              <a:t>2/9/2018</a:t>
             </a:fld>
             <a:endParaRPr lang="en-US"/>
           </a:p>
@@ -599,7 +606,7 @@
           <a:p>
             <a:fld id="{4560DE88-381B-4B33-8E95-473F64105440}" type="datetimeFigureOut">
               <a:rPr lang="en-US" smtClean="0"/>
-              <a:t>10/4/2017</a:t>
+              <a:t>2/9/2018</a:t>
             </a:fld>
             <a:endParaRPr lang="en-US"/>
           </a:p>
@@ -769,7 +776,7 @@
           <a:p>
             <a:fld id="{4560DE88-381B-4B33-8E95-473F64105440}" type="datetimeFigureOut">
               <a:rPr lang="en-US" smtClean="0"/>
-              <a:t>10/4/2017</a:t>
+              <a:t>2/9/2018</a:t>
             </a:fld>
             <a:endParaRPr lang="en-US"/>
           </a:p>
@@ -1013,7 +1020,7 @@
           <a:p>
             <a:fld id="{4560DE88-381B-4B33-8E95-473F64105440}" type="datetimeFigureOut">
               <a:rPr lang="en-US" smtClean="0"/>
-              <a:t>10/4/2017</a:t>
+              <a:t>2/9/2018</a:t>
             </a:fld>
             <a:endParaRPr lang="en-US"/>
           </a:p>
@@ -1245,7 +1252,7 @@
           <a:p>
             <a:fld id="{4560DE88-381B-4B33-8E95-473F64105440}" type="datetimeFigureOut">
               <a:rPr lang="en-US" smtClean="0"/>
-              <a:t>10/4/2017</a:t>
+              <a:t>2/9/2018</a:t>
             </a:fld>
             <a:endParaRPr lang="en-US"/>
           </a:p>
@@ -1612,7 +1619,7 @@
           <a:p>
             <a:fld id="{4560DE88-381B-4B33-8E95-473F64105440}" type="datetimeFigureOut">
               <a:rPr lang="en-US" smtClean="0"/>
-              <a:t>10/4/2017</a:t>
+              <a:t>2/9/2018</a:t>
             </a:fld>
             <a:endParaRPr lang="en-US"/>
           </a:p>
@@ -1730,7 +1737,7 @@
           <a:p>
             <a:fld id="{4560DE88-381B-4B33-8E95-473F64105440}" type="datetimeFigureOut">
               <a:rPr lang="en-US" smtClean="0"/>
-              <a:t>10/4/2017</a:t>
+              <a:t>2/9/2018</a:t>
             </a:fld>
             <a:endParaRPr lang="en-US"/>
           </a:p>
@@ -1825,7 +1832,7 @@
           <a:p>
             <a:fld id="{4560DE88-381B-4B33-8E95-473F64105440}" type="datetimeFigureOut">
               <a:rPr lang="en-US" smtClean="0"/>
-              <a:t>10/4/2017</a:t>
+              <a:t>2/9/2018</a:t>
             </a:fld>
             <a:endParaRPr lang="en-US"/>
           </a:p>
@@ -2102,7 +2109,7 @@
           <a:p>
             <a:fld id="{4560DE88-381B-4B33-8E95-473F64105440}" type="datetimeFigureOut">
               <a:rPr lang="en-US" smtClean="0"/>
-              <a:t>10/4/2017</a:t>
+              <a:t>2/9/2018</a:t>
             </a:fld>
             <a:endParaRPr lang="en-US"/>
           </a:p>
@@ -2359,7 +2366,7 @@
           <a:p>
             <a:fld id="{4560DE88-381B-4B33-8E95-473F64105440}" type="datetimeFigureOut">
               <a:rPr lang="en-US" smtClean="0"/>
-              <a:t>10/4/2017</a:t>
+              <a:t>2/9/2018</a:t>
             </a:fld>
             <a:endParaRPr lang="en-US"/>
           </a:p>
@@ -2572,7 +2579,7 @@
           <a:p>
             <a:fld id="{4560DE88-381B-4B33-8E95-473F64105440}" type="datetimeFigureOut">
               <a:rPr lang="en-US" smtClean="0"/>
-              <a:t>10/4/2017</a:t>
+              <a:t>2/9/2018</a:t>
             </a:fld>
             <a:endParaRPr lang="en-US"/>
           </a:p>
@@ -3069,7 +3076,7 @@
         </p:spPr>
         <p:txBody>
           <a:bodyPr>
-            <a:normAutofit fontScale="92500" lnSpcReduction="10000"/>
+            <a:normAutofit/>
           </a:bodyPr>
           <a:lstStyle/>
           <a:p>
@@ -3102,7 +3109,7 @@
                 <a:latin typeface="Times New Roman" panose="02020603050405020304" pitchFamily="18" charset="0"/>
                 <a:cs typeface="Times New Roman" panose="02020603050405020304" pitchFamily="18" charset="0"/>
               </a:rPr>
-              <a:t>Multi-API Embedded Input Library</a:t>
+              <a:t>Multi-API Compatible Input Library</a:t>
             </a:r>
           </a:p>
           <a:p>
@@ -3122,11 +3129,18 @@
               <a:buNone/>
             </a:pPr>
             <a:r>
+              <a:rPr lang="en-US" sz="3200" dirty="0" err="1">
+                <a:latin typeface="Times New Roman" panose="02020603050405020304" pitchFamily="18" charset="0"/>
+                <a:cs typeface="Times New Roman" panose="02020603050405020304" pitchFamily="18" charset="0"/>
+              </a:rPr>
+              <a:t>Smitty’s</a:t>
+            </a:r>
+            <a:r>
               <a:rPr lang="en-US" sz="3200" dirty="0">
                 <a:latin typeface="Times New Roman" panose="02020603050405020304" pitchFamily="18" charset="0"/>
                 <a:cs typeface="Times New Roman" panose="02020603050405020304" pitchFamily="18" charset="0"/>
               </a:rPr>
-              <a:t>Jim’s Advanced Input Library</a:t>
+              <a:t> Input Library</a:t>
             </a:r>
           </a:p>
           <a:p>
@@ -3138,19 +3152,7 @@
                 <a:latin typeface="Times New Roman" panose="02020603050405020304" pitchFamily="18" charset="0"/>
                 <a:cs typeface="Times New Roman" panose="02020603050405020304" pitchFamily="18" charset="0"/>
               </a:rPr>
-              <a:t>For Multiple API</a:t>
-            </a:r>
-          </a:p>
-          <a:p>
-            <a:pPr marL="0" indent="0" algn="ctr">
-              <a:buNone/>
-            </a:pPr>
-            <a:r>
-              <a:rPr lang="en-US" sz="3200" dirty="0">
-                <a:latin typeface="Times New Roman" panose="02020603050405020304" pitchFamily="18" charset="0"/>
-                <a:cs typeface="Times New Roman" panose="02020603050405020304" pitchFamily="18" charset="0"/>
-              </a:rPr>
-              <a:t>(JAIL4MAPI)</a:t>
+              <a:t>(SInput.lib)</a:t>
             </a:r>
           </a:p>
           <a:p>
@@ -3408,7 +3410,7 @@
             </a:pPr>
             <a:r>
               <a:rPr lang="en-US" sz="1400" dirty="0"/>
-              <a:t>© 2017 </a:t>
+              <a:t>© 2018 </a:t>
             </a:r>
             <a:r>
               <a:rPr lang="en-US" sz="1400" dirty="0" err="1"/>
@@ -3457,6 +3459,455 @@
     <p:extLst>
       <p:ext uri="{BB962C8B-B14F-4D97-AF65-F5344CB8AC3E}">
         <p14:creationId xmlns:p14="http://schemas.microsoft.com/office/powerpoint/2010/main" val="2164139066"/>
+      </p:ext>
+    </p:extLst>
+  </p:cSld>
+  <p:clrMapOvr>
+    <a:masterClrMapping/>
+  </p:clrMapOvr>
+</p:sld>
+</file>
+
+<file path=ppt/slides/slide10.xml><?xml version="1.0" encoding="utf-8"?>
+<p:sld xmlns:a="http://schemas.openxmlformats.org/drawingml/2006/main" xmlns:r="http://schemas.openxmlformats.org/officeDocument/2006/relationships" xmlns:p="http://schemas.openxmlformats.org/presentationml/2006/main">
+  <p:cSld>
+    <p:bg>
+      <p:bgPr>
+        <a:blipFill dpi="0" rotWithShape="1">
+          <a:blip r:embed="rId2">
+            <a:lum/>
+          </a:blip>
+          <a:srcRect/>
+          <a:stretch>
+            <a:fillRect/>
+          </a:stretch>
+        </a:blipFill>
+        <a:effectLst/>
+      </p:bgPr>
+    </p:bg>
+    <p:spTree>
+      <p:nvGrpSpPr>
+        <p:cNvPr id="1" name=""/>
+        <p:cNvGrpSpPr/>
+        <p:nvPr/>
+      </p:nvGrpSpPr>
+      <p:grpSpPr>
+        <a:xfrm>
+          <a:off x="0" y="0"/>
+          <a:ext cx="0" cy="0"/>
+          <a:chOff x="0" y="0"/>
+          <a:chExt cx="0" cy="0"/>
+        </a:xfrm>
+      </p:grpSpPr>
+      <p:sp>
+        <p:nvSpPr>
+          <p:cNvPr id="3" name="Content Placeholder 2">
+            <a:extLst>
+              <a:ext uri="{FF2B5EF4-FFF2-40B4-BE49-F238E27FC236}">
+                <a16:creationId xmlns:a16="http://schemas.microsoft.com/office/drawing/2014/main" id="{1C3F54FD-B5BD-4949-A3D3-52AFAACB16BC}"/>
+              </a:ext>
+            </a:extLst>
+          </p:cNvPr>
+          <p:cNvSpPr>
+            <a:spLocks noGrp="1"/>
+          </p:cNvSpPr>
+          <p:nvPr>
+            <p:ph idx="1"/>
+          </p:nvPr>
+        </p:nvSpPr>
+        <p:spPr>
+          <a:xfrm>
+            <a:off x="1057523" y="1825625"/>
+            <a:ext cx="7100515" cy="4351338"/>
+          </a:xfrm>
+        </p:spPr>
+        <p:txBody>
+          <a:bodyPr/>
+          <a:lstStyle/>
+          <a:p>
+            <a:pPr algn="ctr"/>
+            <a:endParaRPr lang="en-US" dirty="0">
+              <a:latin typeface="Times New Roman" panose="02020603050405020304" pitchFamily="18" charset="0"/>
+              <a:cs typeface="Times New Roman" panose="02020603050405020304" pitchFamily="18" charset="0"/>
+            </a:endParaRPr>
+          </a:p>
+          <a:p>
+            <a:pPr marL="0" indent="0" algn="ctr">
+              <a:buNone/>
+            </a:pPr>
+            <a:endParaRPr lang="en-US" dirty="0">
+              <a:latin typeface="Times New Roman" panose="02020603050405020304" pitchFamily="18" charset="0"/>
+              <a:cs typeface="Times New Roman" panose="02020603050405020304" pitchFamily="18" charset="0"/>
+            </a:endParaRPr>
+          </a:p>
+          <a:p>
+            <a:pPr marL="0" indent="0" algn="ctr">
+              <a:buNone/>
+            </a:pPr>
+            <a:r>
+              <a:rPr lang="en-US" sz="4800" dirty="0">
+                <a:latin typeface="Times New Roman" panose="02020603050405020304" pitchFamily="18" charset="0"/>
+                <a:cs typeface="Times New Roman" panose="02020603050405020304" pitchFamily="18" charset="0"/>
+              </a:rPr>
+              <a:t>Questions?</a:t>
+            </a:r>
+          </a:p>
+        </p:txBody>
+      </p:sp>
+      <p:sp>
+        <p:nvSpPr>
+          <p:cNvPr id="5" name="Title 4">
+            <a:extLst>
+              <a:ext uri="{FF2B5EF4-FFF2-40B4-BE49-F238E27FC236}">
+                <a16:creationId xmlns:a16="http://schemas.microsoft.com/office/drawing/2014/main" id="{536DD991-E7AA-443D-9291-BD1F0FDF39DF}"/>
+              </a:ext>
+            </a:extLst>
+          </p:cNvPr>
+          <p:cNvSpPr>
+            <a:spLocks noGrp="1"/>
+          </p:cNvSpPr>
+          <p:nvPr>
+            <p:ph type="title"/>
+          </p:nvPr>
+        </p:nvSpPr>
+        <p:spPr/>
+        <p:txBody>
+          <a:bodyPr/>
+          <a:lstStyle/>
+          <a:p>
+            <a:r>
+              <a:rPr lang="en-US" dirty="0">
+                <a:latin typeface="Times New Roman" panose="02020603050405020304" pitchFamily="18" charset="0"/>
+                <a:cs typeface="Times New Roman" panose="02020603050405020304" pitchFamily="18" charset="0"/>
+              </a:rPr>
+              <a:t>     </a:t>
+            </a:r>
+          </a:p>
+        </p:txBody>
+      </p:sp>
+      <p:sp>
+        <p:nvSpPr>
+          <p:cNvPr id="7" name="Rectangle 6">
+            <a:extLst>
+              <a:ext uri="{FF2B5EF4-FFF2-40B4-BE49-F238E27FC236}">
+                <a16:creationId xmlns:a16="http://schemas.microsoft.com/office/drawing/2014/main" id="{91D4DD41-00DF-4191-8037-5F35FC0A53A6}"/>
+              </a:ext>
+            </a:extLst>
+          </p:cNvPr>
+          <p:cNvSpPr/>
+          <p:nvPr/>
+        </p:nvSpPr>
+        <p:spPr>
+          <a:xfrm>
+            <a:off x="1335819" y="1431235"/>
+            <a:ext cx="7402664" cy="182880"/>
+          </a:xfrm>
+          <a:prstGeom prst="rect">
+            <a:avLst/>
+          </a:prstGeom>
+          <a:solidFill>
+            <a:schemeClr val="bg1"/>
+          </a:solidFill>
+          <a:ln>
+            <a:solidFill>
+              <a:schemeClr val="bg1"/>
+            </a:solidFill>
+          </a:ln>
+        </p:spPr>
+        <p:style>
+          <a:lnRef idx="2">
+            <a:schemeClr val="accent1">
+              <a:shade val="50000"/>
+            </a:schemeClr>
+          </a:lnRef>
+          <a:fillRef idx="1">
+            <a:schemeClr val="accent1"/>
+          </a:fillRef>
+          <a:effectRef idx="0">
+            <a:schemeClr val="accent1"/>
+          </a:effectRef>
+          <a:fontRef idx="minor">
+            <a:schemeClr val="lt1"/>
+          </a:fontRef>
+        </p:style>
+        <p:txBody>
+          <a:bodyPr rtlCol="0" anchor="ctr"/>
+          <a:lstStyle/>
+          <a:p>
+            <a:pPr algn="ctr"/>
+            <a:endParaRPr lang="en-US"/>
+          </a:p>
+        </p:txBody>
+      </p:sp>
+      <p:sp>
+        <p:nvSpPr>
+          <p:cNvPr id="8" name="Content Placeholder 2">
+            <a:extLst>
+              <a:ext uri="{FF2B5EF4-FFF2-40B4-BE49-F238E27FC236}">
+                <a16:creationId xmlns:a16="http://schemas.microsoft.com/office/drawing/2014/main" id="{77E2C85A-EF55-46D6-8AA5-5E14693D8110}"/>
+              </a:ext>
+            </a:extLst>
+          </p:cNvPr>
+          <p:cNvSpPr txBox="1">
+            <a:spLocks/>
+          </p:cNvSpPr>
+          <p:nvPr/>
+        </p:nvSpPr>
+        <p:spPr>
+          <a:xfrm>
+            <a:off x="286247" y="6154309"/>
+            <a:ext cx="8571506" cy="532739"/>
+          </a:xfrm>
+          <a:prstGeom prst="rect">
+            <a:avLst/>
+          </a:prstGeom>
+        </p:spPr>
+        <p:txBody>
+          <a:bodyPr vert="horz" lIns="91440" tIns="45720" rIns="91440" bIns="45720" numCol="2" rtlCol="0">
+            <a:noAutofit/>
+          </a:bodyPr>
+          <a:lstStyle>
+            <a:lvl1pPr marL="228600" indent="-228600" algn="l" defTabSz="914400" rtl="0" eaLnBrk="1" latinLnBrk="0" hangingPunct="1">
+              <a:lnSpc>
+                <a:spcPct val="90000"/>
+              </a:lnSpc>
+              <a:spcBef>
+                <a:spcPts val="1000"/>
+              </a:spcBef>
+              <a:buFont typeface="Arial" panose="020B0604020202020204" pitchFamily="34" charset="0"/>
+              <a:buChar char="•"/>
+              <a:defRPr sz="2800" kern="1200">
+                <a:solidFill>
+                  <a:schemeClr val="tx1"/>
+                </a:solidFill>
+                <a:latin typeface="+mn-lt"/>
+                <a:ea typeface="+mn-ea"/>
+                <a:cs typeface="+mn-cs"/>
+              </a:defRPr>
+            </a:lvl1pPr>
+            <a:lvl2pPr marL="685800" indent="-228600" algn="l" defTabSz="914400" rtl="0" eaLnBrk="1" latinLnBrk="0" hangingPunct="1">
+              <a:lnSpc>
+                <a:spcPct val="90000"/>
+              </a:lnSpc>
+              <a:spcBef>
+                <a:spcPts val="500"/>
+              </a:spcBef>
+              <a:buFont typeface="Arial" panose="020B0604020202020204" pitchFamily="34" charset="0"/>
+              <a:buChar char="•"/>
+              <a:defRPr sz="2400" kern="1200">
+                <a:solidFill>
+                  <a:schemeClr val="tx1"/>
+                </a:solidFill>
+                <a:latin typeface="+mn-lt"/>
+                <a:ea typeface="+mn-ea"/>
+                <a:cs typeface="+mn-cs"/>
+              </a:defRPr>
+            </a:lvl2pPr>
+            <a:lvl3pPr marL="1143000" indent="-228600" algn="l" defTabSz="914400" rtl="0" eaLnBrk="1" latinLnBrk="0" hangingPunct="1">
+              <a:lnSpc>
+                <a:spcPct val="90000"/>
+              </a:lnSpc>
+              <a:spcBef>
+                <a:spcPts val="500"/>
+              </a:spcBef>
+              <a:buFont typeface="Arial" panose="020B0604020202020204" pitchFamily="34" charset="0"/>
+              <a:buChar char="•"/>
+              <a:defRPr sz="2000" kern="1200">
+                <a:solidFill>
+                  <a:schemeClr val="tx1"/>
+                </a:solidFill>
+                <a:latin typeface="+mn-lt"/>
+                <a:ea typeface="+mn-ea"/>
+                <a:cs typeface="+mn-cs"/>
+              </a:defRPr>
+            </a:lvl3pPr>
+            <a:lvl4pPr marL="1600200" indent="-228600" algn="l" defTabSz="914400" rtl="0" eaLnBrk="1" latinLnBrk="0" hangingPunct="1">
+              <a:lnSpc>
+                <a:spcPct val="90000"/>
+              </a:lnSpc>
+              <a:spcBef>
+                <a:spcPts val="500"/>
+              </a:spcBef>
+              <a:buFont typeface="Arial" panose="020B0604020202020204" pitchFamily="34" charset="0"/>
+              <a:buChar char="•"/>
+              <a:defRPr sz="1800" kern="1200">
+                <a:solidFill>
+                  <a:schemeClr val="tx1"/>
+                </a:solidFill>
+                <a:latin typeface="+mn-lt"/>
+                <a:ea typeface="+mn-ea"/>
+                <a:cs typeface="+mn-cs"/>
+              </a:defRPr>
+            </a:lvl4pPr>
+            <a:lvl5pPr marL="2057400" indent="-228600" algn="l" defTabSz="914400" rtl="0" eaLnBrk="1" latinLnBrk="0" hangingPunct="1">
+              <a:lnSpc>
+                <a:spcPct val="90000"/>
+              </a:lnSpc>
+              <a:spcBef>
+                <a:spcPts val="500"/>
+              </a:spcBef>
+              <a:buFont typeface="Arial" panose="020B0604020202020204" pitchFamily="34" charset="0"/>
+              <a:buChar char="•"/>
+              <a:defRPr sz="1800" kern="1200">
+                <a:solidFill>
+                  <a:schemeClr val="tx1"/>
+                </a:solidFill>
+                <a:latin typeface="+mn-lt"/>
+                <a:ea typeface="+mn-ea"/>
+                <a:cs typeface="+mn-cs"/>
+              </a:defRPr>
+            </a:lvl5pPr>
+            <a:lvl6pPr marL="2514600" indent="-228600" algn="l" defTabSz="914400" rtl="0" eaLnBrk="1" latinLnBrk="0" hangingPunct="1">
+              <a:lnSpc>
+                <a:spcPct val="90000"/>
+              </a:lnSpc>
+              <a:spcBef>
+                <a:spcPts val="500"/>
+              </a:spcBef>
+              <a:buFont typeface="Arial" panose="020B0604020202020204" pitchFamily="34" charset="0"/>
+              <a:buChar char="•"/>
+              <a:defRPr sz="1800" kern="1200">
+                <a:solidFill>
+                  <a:schemeClr val="tx1"/>
+                </a:solidFill>
+                <a:latin typeface="+mn-lt"/>
+                <a:ea typeface="+mn-ea"/>
+                <a:cs typeface="+mn-cs"/>
+              </a:defRPr>
+            </a:lvl6pPr>
+            <a:lvl7pPr marL="2971800" indent="-228600" algn="l" defTabSz="914400" rtl="0" eaLnBrk="1" latinLnBrk="0" hangingPunct="1">
+              <a:lnSpc>
+                <a:spcPct val="90000"/>
+              </a:lnSpc>
+              <a:spcBef>
+                <a:spcPts val="500"/>
+              </a:spcBef>
+              <a:buFont typeface="Arial" panose="020B0604020202020204" pitchFamily="34" charset="0"/>
+              <a:buChar char="•"/>
+              <a:defRPr sz="1800" kern="1200">
+                <a:solidFill>
+                  <a:schemeClr val="tx1"/>
+                </a:solidFill>
+                <a:latin typeface="+mn-lt"/>
+                <a:ea typeface="+mn-ea"/>
+                <a:cs typeface="+mn-cs"/>
+              </a:defRPr>
+            </a:lvl7pPr>
+            <a:lvl8pPr marL="3429000" indent="-228600" algn="l" defTabSz="914400" rtl="0" eaLnBrk="1" latinLnBrk="0" hangingPunct="1">
+              <a:lnSpc>
+                <a:spcPct val="90000"/>
+              </a:lnSpc>
+              <a:spcBef>
+                <a:spcPts val="500"/>
+              </a:spcBef>
+              <a:buFont typeface="Arial" panose="020B0604020202020204" pitchFamily="34" charset="0"/>
+              <a:buChar char="•"/>
+              <a:defRPr sz="1800" kern="1200">
+                <a:solidFill>
+                  <a:schemeClr val="tx1"/>
+                </a:solidFill>
+                <a:latin typeface="+mn-lt"/>
+                <a:ea typeface="+mn-ea"/>
+                <a:cs typeface="+mn-cs"/>
+              </a:defRPr>
+            </a:lvl8pPr>
+            <a:lvl9pPr marL="3886200" indent="-228600" algn="l" defTabSz="914400" rtl="0" eaLnBrk="1" latinLnBrk="0" hangingPunct="1">
+              <a:lnSpc>
+                <a:spcPct val="90000"/>
+              </a:lnSpc>
+              <a:spcBef>
+                <a:spcPts val="500"/>
+              </a:spcBef>
+              <a:buFont typeface="Arial" panose="020B0604020202020204" pitchFamily="34" charset="0"/>
+              <a:buChar char="•"/>
+              <a:defRPr sz="1800" kern="1200">
+                <a:solidFill>
+                  <a:schemeClr val="tx1"/>
+                </a:solidFill>
+                <a:latin typeface="+mn-lt"/>
+                <a:ea typeface="+mn-ea"/>
+                <a:cs typeface="+mn-cs"/>
+              </a:defRPr>
+            </a:lvl9pPr>
+          </a:lstStyle>
+          <a:p>
+            <a:pPr marL="0" indent="0">
+              <a:lnSpc>
+                <a:spcPct val="100000"/>
+              </a:lnSpc>
+              <a:spcBef>
+                <a:spcPts val="0"/>
+              </a:spcBef>
+              <a:buFont typeface="Arial" panose="020B0604020202020204" pitchFamily="34" charset="0"/>
+              <a:buNone/>
+            </a:pPr>
+            <a:r>
+              <a:rPr lang="en-US" sz="1400" dirty="0"/>
+              <a:t>GAM400 Milestone 1</a:t>
+            </a:r>
+          </a:p>
+          <a:p>
+            <a:pPr marL="0" indent="0">
+              <a:lnSpc>
+                <a:spcPct val="100000"/>
+              </a:lnSpc>
+              <a:spcBef>
+                <a:spcPts val="0"/>
+              </a:spcBef>
+              <a:buFont typeface="Arial" panose="020B0604020202020204" pitchFamily="34" charset="0"/>
+              <a:buNone/>
+            </a:pPr>
+            <a:r>
+              <a:rPr lang="en-US" sz="1400" dirty="0"/>
+              <a:t>© 2018 </a:t>
+            </a:r>
+            <a:r>
+              <a:rPr lang="en-US" sz="1400" dirty="0" err="1"/>
+              <a:t>DigiPen</a:t>
+            </a:r>
+            <a:r>
+              <a:rPr lang="en-US" sz="1400" dirty="0"/>
+              <a:t> (USA) Corporation</a:t>
+            </a:r>
+          </a:p>
+          <a:p>
+            <a:pPr marL="0" indent="0" algn="r">
+              <a:lnSpc>
+                <a:spcPct val="100000"/>
+              </a:lnSpc>
+              <a:spcBef>
+                <a:spcPts val="0"/>
+              </a:spcBef>
+              <a:buFont typeface="Arial" panose="020B0604020202020204" pitchFamily="34" charset="0"/>
+              <a:buNone/>
+            </a:pPr>
+            <a:r>
+              <a:rPr lang="en-US" sz="1400" dirty="0"/>
+              <a:t>Instructor: Jen Sward</a:t>
+            </a:r>
+          </a:p>
+          <a:p>
+            <a:pPr marL="0" indent="0" algn="r">
+              <a:lnSpc>
+                <a:spcPct val="100000"/>
+              </a:lnSpc>
+              <a:spcBef>
+                <a:spcPts val="0"/>
+              </a:spcBef>
+              <a:buFont typeface="Arial" panose="020B0604020202020204" pitchFamily="34" charset="0"/>
+              <a:buNone/>
+            </a:pPr>
+            <a:r>
+              <a:rPr lang="en-US" sz="1400" dirty="0"/>
+              <a:t>By: James Schmidt</a:t>
+            </a:r>
+          </a:p>
+        </p:txBody>
+      </p:sp>
+    </p:spTree>
+    <p:extLst>
+      <p:ext uri="{BB962C8B-B14F-4D97-AF65-F5344CB8AC3E}">
+        <p14:creationId xmlns:p14="http://schemas.microsoft.com/office/powerpoint/2010/main" val="3927511870"/>
       </p:ext>
     </p:extLst>
   </p:cSld>
@@ -3572,19 +4023,8 @@
                 <a:latin typeface="Times New Roman" panose="02020603050405020304" pitchFamily="18" charset="0"/>
                 <a:cs typeface="Times New Roman" panose="02020603050405020304" pitchFamily="18" charset="0"/>
               </a:rPr>
-              <a:t>GLFW, SDL, SFML, Windows-</a:t>
-            </a:r>
-            <a:r>
-              <a:rPr lang="en-US" dirty="0" err="1">
-                <a:latin typeface="Times New Roman" panose="02020603050405020304" pitchFamily="18" charset="0"/>
-                <a:cs typeface="Times New Roman" panose="02020603050405020304" pitchFamily="18" charset="0"/>
-              </a:rPr>
-              <a:t>XInput</a:t>
-            </a:r>
-            <a:endParaRPr lang="en-US" dirty="0">
-              <a:latin typeface="Times New Roman" panose="02020603050405020304" pitchFamily="18" charset="0"/>
-              <a:cs typeface="Times New Roman" panose="02020603050405020304" pitchFamily="18" charset="0"/>
-            </a:endParaRPr>
+              <a:t>GLFW, SDL, SFML</a:t>
+            </a:r>
           </a:p>
           <a:p>
             <a:pPr marL="457200" lvl="1" indent="0">
@@ -3657,10 +4097,10 @@
       </p:sp>
       <p:sp>
         <p:nvSpPr>
-          <p:cNvPr id="6" name="Content Placeholder 2">
+          <p:cNvPr id="8" name="Content Placeholder 2">
             <a:extLst>
               <a:ext uri="{FF2B5EF4-FFF2-40B4-BE49-F238E27FC236}">
-                <a16:creationId xmlns:a16="http://schemas.microsoft.com/office/drawing/2014/main" id="{E30968E5-0E71-4FE3-BE2E-21FAD198318C}"/>
+                <a16:creationId xmlns:a16="http://schemas.microsoft.com/office/drawing/2014/main" id="{34306CE5-191B-49B5-B3E2-6284B6F4F943}"/>
               </a:ext>
             </a:extLst>
           </p:cNvPr>
@@ -3875,7 +4315,7 @@
             </a:pPr>
             <a:r>
               <a:rPr lang="en-US" sz="1400" dirty="0"/>
-              <a:t>© 2017 </a:t>
+              <a:t>© 2018 </a:t>
             </a:r>
             <a:r>
               <a:rPr lang="en-US" sz="1400" dirty="0" err="1"/>
@@ -4027,7 +4467,21 @@
                 <a:latin typeface="Times New Roman" panose="02020603050405020304" pitchFamily="18" charset="0"/>
                 <a:cs typeface="Times New Roman" panose="02020603050405020304" pitchFamily="18" charset="0"/>
               </a:rPr>
-              <a:t>Debugging via command prompt window</a:t>
+              <a:t>Built-in </a:t>
+            </a:r>
+            <a:r>
+              <a:rPr lang="en-US" dirty="0" err="1">
+                <a:latin typeface="Times New Roman" panose="02020603050405020304" pitchFamily="18" charset="0"/>
+                <a:cs typeface="Times New Roman" panose="02020603050405020304" pitchFamily="18" charset="0"/>
+              </a:rPr>
+              <a:t>ImGUI</a:t>
+            </a:r>
+            <a:r>
+              <a:rPr lang="en-US" dirty="0">
+                <a:latin typeface="Times New Roman" panose="02020603050405020304" pitchFamily="18" charset="0"/>
+                <a:cs typeface="Times New Roman" panose="02020603050405020304" pitchFamily="18" charset="0"/>
+              </a:rPr>
+              <a:t> interface</a:t>
             </a:r>
           </a:p>
           <a:p>
@@ -4063,17 +4517,21 @@
                 <a:latin typeface="Times New Roman" panose="02020603050405020304" pitchFamily="18" charset="0"/>
                 <a:cs typeface="Times New Roman" panose="02020603050405020304" pitchFamily="18" charset="0"/>
               </a:rPr>
-              <a:t>Graphical display interface</a:t>
-            </a:r>
-          </a:p>
-          <a:p>
-            <a:pPr lvl="1"/>
+              <a:t>Integration with Windows API (</a:t>
+            </a:r>
+            <a:r>
+              <a:rPr lang="en-US" dirty="0" err="1">
+                <a:latin typeface="Times New Roman" panose="02020603050405020304" pitchFamily="18" charset="0"/>
+                <a:cs typeface="Times New Roman" panose="02020603050405020304" pitchFamily="18" charset="0"/>
+              </a:rPr>
+              <a:t>XInput</a:t>
+            </a:r>
             <a:r>
               <a:rPr lang="en-US" dirty="0">
                 <a:latin typeface="Times New Roman" panose="02020603050405020304" pitchFamily="18" charset="0"/>
                 <a:cs typeface="Times New Roman" panose="02020603050405020304" pitchFamily="18" charset="0"/>
               </a:rPr>
-              <a:t>Swappable API windows</a:t>
+              <a:t>) and Unity</a:t>
             </a:r>
           </a:p>
           <a:p>
@@ -4083,7 +4541,7 @@
                 <a:latin typeface="Times New Roman" panose="02020603050405020304" pitchFamily="18" charset="0"/>
                 <a:cs typeface="Times New Roman" panose="02020603050405020304" pitchFamily="18" charset="0"/>
               </a:rPr>
-              <a:t>Small mini game that utilizes input features</a:t>
+              <a:t>Integration with OpenCV, to link hand tracking and gesture recognition to Input</a:t>
             </a:r>
           </a:p>
         </p:txBody>
@@ -4121,10 +4579,10 @@
       </p:sp>
       <p:sp>
         <p:nvSpPr>
-          <p:cNvPr id="6" name="Content Placeholder 2">
+          <p:cNvPr id="7" name="Content Placeholder 2">
             <a:extLst>
               <a:ext uri="{FF2B5EF4-FFF2-40B4-BE49-F238E27FC236}">
-                <a16:creationId xmlns:a16="http://schemas.microsoft.com/office/drawing/2014/main" id="{E30968E5-0E71-4FE3-BE2E-21FAD198318C}"/>
+                <a16:creationId xmlns:a16="http://schemas.microsoft.com/office/drawing/2014/main" id="{1BD3C30E-3CBB-48C5-A6E2-312C4F169F9B}"/>
               </a:ext>
             </a:extLst>
           </p:cNvPr>
@@ -4339,7 +4797,7 @@
             </a:pPr>
             <a:r>
               <a:rPr lang="en-US" sz="1400" dirty="0"/>
-              <a:t>© 2017 </a:t>
+              <a:t>© 2018 </a:t>
             </a:r>
             <a:r>
               <a:rPr lang="en-US" sz="1400" dirty="0" err="1"/>
@@ -4502,7 +4960,7 @@
                 <a:latin typeface="Times New Roman" panose="02020603050405020304" pitchFamily="18" charset="0"/>
                 <a:cs typeface="Times New Roman" panose="02020603050405020304" pitchFamily="18" charset="0"/>
               </a:rPr>
-              <a:t>Mouse, Keyboard, Joystick</a:t>
+              <a:t>Mouse, Keyboard, Gamepad</a:t>
             </a:r>
           </a:p>
           <a:p>
@@ -4546,10 +5004,10 @@
       </p:sp>
       <p:sp>
         <p:nvSpPr>
-          <p:cNvPr id="6" name="Content Placeholder 2">
+          <p:cNvPr id="7" name="Content Placeholder 2">
             <a:extLst>
               <a:ext uri="{FF2B5EF4-FFF2-40B4-BE49-F238E27FC236}">
-                <a16:creationId xmlns:a16="http://schemas.microsoft.com/office/drawing/2014/main" id="{E30968E5-0E71-4FE3-BE2E-21FAD198318C}"/>
+                <a16:creationId xmlns:a16="http://schemas.microsoft.com/office/drawing/2014/main" id="{F2E85F42-F5AF-4212-BD9E-2A8BAB7C076D}"/>
               </a:ext>
             </a:extLst>
           </p:cNvPr>
@@ -4764,7 +5222,7 @@
             </a:pPr>
             <a:r>
               <a:rPr lang="en-US" sz="1400" dirty="0"/>
-              <a:t>© 2017 </a:t>
+              <a:t>© 2018 </a:t>
             </a:r>
             <a:r>
               <a:rPr lang="en-US" sz="1400" dirty="0" err="1"/>
@@ -4876,8 +5334,19 @@
           </a:xfrm>
         </p:spPr>
         <p:txBody>
-          <a:bodyPr/>
+          <a:bodyPr>
+            <a:normAutofit fontScale="92500" lnSpcReduction="10000"/>
+          </a:bodyPr>
           <a:lstStyle/>
+          <a:p>
+            <a:r>
+              <a:rPr lang="en-US" dirty="0">
+                <a:latin typeface="Times New Roman" panose="02020603050405020304" pitchFamily="18" charset="0"/>
+                <a:cs typeface="Times New Roman" panose="02020603050405020304" pitchFamily="18" charset="0"/>
+              </a:rPr>
+              <a:t>Robust Input Detection</a:t>
+            </a:r>
+          </a:p>
           <a:p>
             <a:r>
               <a:rPr lang="en-US" dirty="0">
@@ -4893,6 +5362,24 @@
                 <a:latin typeface="Times New Roman" panose="02020603050405020304" pitchFamily="18" charset="0"/>
                 <a:cs typeface="Times New Roman" panose="02020603050405020304" pitchFamily="18" charset="0"/>
               </a:rPr>
+              <a:t>Virtual Controller</a:t>
+            </a:r>
+          </a:p>
+          <a:p>
+            <a:r>
+              <a:rPr lang="en-US" dirty="0">
+                <a:latin typeface="Times New Roman" panose="02020603050405020304" pitchFamily="18" charset="0"/>
+                <a:cs typeface="Times New Roman" panose="02020603050405020304" pitchFamily="18" charset="0"/>
+              </a:rPr>
+              <a:t>Monkey (RNG)</a:t>
+            </a:r>
+          </a:p>
+          <a:p>
+            <a:r>
+              <a:rPr lang="en-US" dirty="0">
+                <a:latin typeface="Times New Roman" panose="02020603050405020304" pitchFamily="18" charset="0"/>
+                <a:cs typeface="Times New Roman" panose="02020603050405020304" pitchFamily="18" charset="0"/>
+              </a:rPr>
               <a:t>Key/Button Mapping</a:t>
             </a:r>
           </a:p>
@@ -4911,7 +5398,7 @@
                 <a:latin typeface="Times New Roman" panose="02020603050405020304" pitchFamily="18" charset="0"/>
                 <a:cs typeface="Times New Roman" panose="02020603050405020304" pitchFamily="18" charset="0"/>
               </a:rPr>
-              <a:t>Robust Input Detection</a:t>
+              <a:t>Combination Detection</a:t>
             </a:r>
           </a:p>
           <a:p>
@@ -4920,41 +5407,26 @@
                 <a:latin typeface="Times New Roman" panose="02020603050405020304" pitchFamily="18" charset="0"/>
                 <a:cs typeface="Times New Roman" panose="02020603050405020304" pitchFamily="18" charset="0"/>
               </a:rPr>
-              <a:t>Plug and Play</a:t>
-            </a:r>
-          </a:p>
-          <a:p>
+              <a:t>Plug and Play Detection *</a:t>
+            </a:r>
+          </a:p>
+          <a:p>
+            <a:endParaRPr lang="en-US" dirty="0">
+              <a:latin typeface="Times New Roman" panose="02020603050405020304" pitchFamily="18" charset="0"/>
+              <a:cs typeface="Times New Roman" panose="02020603050405020304" pitchFamily="18" charset="0"/>
+            </a:endParaRPr>
+          </a:p>
+          <a:p>
+            <a:pPr marL="457200" lvl="1" indent="0" algn="r">
+              <a:buNone/>
+            </a:pPr>
             <a:r>
               <a:rPr lang="en-US" dirty="0">
                 <a:latin typeface="Times New Roman" panose="02020603050405020304" pitchFamily="18" charset="0"/>
                 <a:cs typeface="Times New Roman" panose="02020603050405020304" pitchFamily="18" charset="0"/>
               </a:rPr>
-              <a:t>Combination Detection</a:t>
-            </a:r>
-          </a:p>
-          <a:p>
-            <a:r>
-              <a:rPr lang="en-US" dirty="0">
-                <a:latin typeface="Times New Roman" panose="02020603050405020304" pitchFamily="18" charset="0"/>
-                <a:cs typeface="Times New Roman" panose="02020603050405020304" pitchFamily="18" charset="0"/>
-              </a:rPr>
-              <a:t>Virtual Controller</a:t>
-            </a:r>
-          </a:p>
-          <a:p>
-            <a:r>
-              <a:rPr lang="en-US" dirty="0">
-                <a:latin typeface="Times New Roman" panose="02020603050405020304" pitchFamily="18" charset="0"/>
-                <a:cs typeface="Times New Roman" panose="02020603050405020304" pitchFamily="18" charset="0"/>
-              </a:rPr>
-              <a:t>Monkey</a:t>
-            </a:r>
-          </a:p>
-          <a:p>
-            <a:endParaRPr lang="en-US" dirty="0">
-              <a:latin typeface="Times New Roman" panose="02020603050405020304" pitchFamily="18" charset="0"/>
-              <a:cs typeface="Times New Roman" panose="02020603050405020304" pitchFamily="18" charset="0"/>
-            </a:endParaRPr>
+              <a:t>* May be dependent on window API</a:t>
+            </a:r>
           </a:p>
         </p:txBody>
       </p:sp>
@@ -4991,10 +5463,10 @@
       </p:sp>
       <p:sp>
         <p:nvSpPr>
-          <p:cNvPr id="6" name="Content Placeholder 2">
+          <p:cNvPr id="7" name="Content Placeholder 2">
             <a:extLst>
               <a:ext uri="{FF2B5EF4-FFF2-40B4-BE49-F238E27FC236}">
-                <a16:creationId xmlns:a16="http://schemas.microsoft.com/office/drawing/2014/main" id="{E30968E5-0E71-4FE3-BE2E-21FAD198318C}"/>
+                <a16:creationId xmlns:a16="http://schemas.microsoft.com/office/drawing/2014/main" id="{EDE57081-83D9-4F51-9A62-CF1CF64E4526}"/>
               </a:ext>
             </a:extLst>
           </p:cNvPr>
@@ -5209,7 +5681,7 @@
             </a:pPr>
             <a:r>
               <a:rPr lang="en-US" sz="1400" dirty="0"/>
-              <a:t>© 2017 </a:t>
+              <a:t>© 2018 </a:t>
             </a:r>
             <a:r>
               <a:rPr lang="en-US" sz="1400" dirty="0" err="1"/>
@@ -5329,24 +5801,6 @@
                 <a:latin typeface="Times New Roman" panose="02020603050405020304" pitchFamily="18" charset="0"/>
                 <a:cs typeface="Times New Roman" panose="02020603050405020304" pitchFamily="18" charset="0"/>
               </a:rPr>
-              <a:t>Replay</a:t>
-            </a:r>
-          </a:p>
-          <a:p>
-            <a:r>
-              <a:rPr lang="en-US" dirty="0">
-                <a:latin typeface="Times New Roman" panose="02020603050405020304" pitchFamily="18" charset="0"/>
-                <a:cs typeface="Times New Roman" panose="02020603050405020304" pitchFamily="18" charset="0"/>
-              </a:rPr>
-              <a:t>Single Source Rewind</a:t>
-            </a:r>
-          </a:p>
-          <a:p>
-            <a:r>
-              <a:rPr lang="en-US" dirty="0">
-                <a:latin typeface="Times New Roman" panose="02020603050405020304" pitchFamily="18" charset="0"/>
-                <a:cs typeface="Times New Roman" panose="02020603050405020304" pitchFamily="18" charset="0"/>
-              </a:rPr>
               <a:t>N-Grams</a:t>
             </a:r>
           </a:p>
@@ -5365,7 +5819,7 @@
                 <a:latin typeface="Times New Roman" panose="02020603050405020304" pitchFamily="18" charset="0"/>
                 <a:cs typeface="Times New Roman" panose="02020603050405020304" pitchFamily="18" charset="0"/>
               </a:rPr>
-              <a:t>Fuzzy Controller*</a:t>
+              <a:t>Replay *</a:t>
             </a:r>
           </a:p>
           <a:p>
@@ -5374,10 +5828,13 @@
                 <a:latin typeface="Times New Roman" panose="02020603050405020304" pitchFamily="18" charset="0"/>
                 <a:cs typeface="Times New Roman" panose="02020603050405020304" pitchFamily="18" charset="0"/>
               </a:rPr>
-              <a:t>AI Controller*</a:t>
-            </a:r>
-          </a:p>
-          <a:p>
+              <a:t>Single Source Rewind *</a:t>
+            </a:r>
+          </a:p>
+          <a:p>
+            <a:pPr marL="0" indent="0">
+              <a:buNone/>
+            </a:pPr>
             <a:endParaRPr lang="en-US" dirty="0">
               <a:latin typeface="Times New Roman" panose="02020603050405020304" pitchFamily="18" charset="0"/>
               <a:cs typeface="Times New Roman" panose="02020603050405020304" pitchFamily="18" charset="0"/>
@@ -5387,13 +5844,40 @@
             <a:pPr marL="0" indent="0">
               <a:buNone/>
             </a:pPr>
-            <a:r>
-              <a:rPr lang="en-US" dirty="0">
+            <a:endParaRPr lang="en-US" dirty="0">
+              <a:latin typeface="Times New Roman" panose="02020603050405020304" pitchFamily="18" charset="0"/>
+              <a:cs typeface="Times New Roman" panose="02020603050405020304" pitchFamily="18" charset="0"/>
+            </a:endParaRPr>
+          </a:p>
+          <a:p>
+            <a:pPr marL="0" indent="0">
+              <a:buNone/>
+            </a:pPr>
+            <a:endParaRPr lang="en-US" dirty="0">
+              <a:latin typeface="Times New Roman" panose="02020603050405020304" pitchFamily="18" charset="0"/>
+              <a:cs typeface="Times New Roman" panose="02020603050405020304" pitchFamily="18" charset="0"/>
+            </a:endParaRPr>
+          </a:p>
+          <a:p>
+            <a:pPr marL="0" indent="0" algn="r">
+              <a:buNone/>
+            </a:pPr>
+            <a:r>
+              <a:rPr lang="en-US" sz="2400" dirty="0">
                 <a:latin typeface="Times New Roman" panose="02020603050405020304" pitchFamily="18" charset="0"/>
                 <a:cs typeface="Times New Roman" panose="02020603050405020304" pitchFamily="18" charset="0"/>
               </a:rPr>
-              <a:t>*scope and time dependent</a:t>
-            </a:r>
+              <a:t>* Requires a full working engine to demo</a:t>
+            </a:r>
+          </a:p>
+          <a:p>
+            <a:pPr marL="0" indent="0" algn="r">
+              <a:buNone/>
+            </a:pPr>
+            <a:endParaRPr lang="en-US" dirty="0">
+              <a:latin typeface="Times New Roman" panose="02020603050405020304" pitchFamily="18" charset="0"/>
+              <a:cs typeface="Times New Roman" panose="02020603050405020304" pitchFamily="18" charset="0"/>
+            </a:endParaRPr>
           </a:p>
         </p:txBody>
       </p:sp>
@@ -5430,10 +5914,10 @@
       </p:sp>
       <p:sp>
         <p:nvSpPr>
-          <p:cNvPr id="6" name="Content Placeholder 2">
+          <p:cNvPr id="7" name="Content Placeholder 2">
             <a:extLst>
               <a:ext uri="{FF2B5EF4-FFF2-40B4-BE49-F238E27FC236}">
-                <a16:creationId xmlns:a16="http://schemas.microsoft.com/office/drawing/2014/main" id="{E30968E5-0E71-4FE3-BE2E-21FAD198318C}"/>
+                <a16:creationId xmlns:a16="http://schemas.microsoft.com/office/drawing/2014/main" id="{7EE7A2A5-69F3-4821-95B6-A42034C15A11}"/>
               </a:ext>
             </a:extLst>
           </p:cNvPr>
@@ -5648,7 +6132,7 @@
             </a:pPr>
             <a:r>
               <a:rPr lang="en-US" sz="1400" dirty="0"/>
-              <a:t>© 2017 </a:t>
+              <a:t>© 2018 </a:t>
             </a:r>
             <a:r>
               <a:rPr lang="en-US" sz="1400" dirty="0" err="1"/>
@@ -5739,101 +6223,6 @@
       </p:grpSpPr>
       <p:sp>
         <p:nvSpPr>
-          <p:cNvPr id="3" name="Content Placeholder 2">
-            <a:extLst>
-              <a:ext uri="{FF2B5EF4-FFF2-40B4-BE49-F238E27FC236}">
-                <a16:creationId xmlns:a16="http://schemas.microsoft.com/office/drawing/2014/main" id="{1C3F54FD-B5BD-4949-A3D3-52AFAACB16BC}"/>
-              </a:ext>
-            </a:extLst>
-          </p:cNvPr>
-          <p:cNvSpPr>
-            <a:spLocks noGrp="1"/>
-          </p:cNvSpPr>
-          <p:nvPr>
-            <p:ph idx="1"/>
-          </p:nvPr>
-        </p:nvSpPr>
-        <p:spPr>
-          <a:xfrm>
-            <a:off x="1057523" y="1825625"/>
-            <a:ext cx="7457826" cy="4351338"/>
-          </a:xfrm>
-        </p:spPr>
-        <p:txBody>
-          <a:bodyPr/>
-          <a:lstStyle/>
-          <a:p>
-            <a:r>
-              <a:rPr lang="en-US" dirty="0">
-                <a:latin typeface="Times New Roman" panose="02020603050405020304" pitchFamily="18" charset="0"/>
-                <a:cs typeface="Times New Roman" panose="02020603050405020304" pitchFamily="18" charset="0"/>
-              </a:rPr>
-              <a:t>2.5D generated objects using 2D image stacking</a:t>
-            </a:r>
-          </a:p>
-          <a:p>
-            <a:endParaRPr lang="en-US" dirty="0">
-              <a:latin typeface="Times New Roman" panose="02020603050405020304" pitchFamily="18" charset="0"/>
-              <a:cs typeface="Times New Roman" panose="02020603050405020304" pitchFamily="18" charset="0"/>
-            </a:endParaRPr>
-          </a:p>
-          <a:p>
-            <a:r>
-              <a:rPr lang="en-US" dirty="0">
-                <a:latin typeface="Times New Roman" panose="02020603050405020304" pitchFamily="18" charset="0"/>
-                <a:cs typeface="Times New Roman" panose="02020603050405020304" pitchFamily="18" charset="0"/>
-              </a:rPr>
-              <a:t>Creating a 2D game via </a:t>
-            </a:r>
-            <a:r>
-              <a:rPr lang="en-US" dirty="0" err="1">
-                <a:latin typeface="Times New Roman" panose="02020603050405020304" pitchFamily="18" charset="0"/>
-                <a:cs typeface="Times New Roman" panose="02020603050405020304" pitchFamily="18" charset="0"/>
-              </a:rPr>
-              <a:t>GameMaker</a:t>
-            </a:r>
-            <a:r>
-              <a:rPr lang="en-US" dirty="0">
-                <a:latin typeface="Times New Roman" panose="02020603050405020304" pitchFamily="18" charset="0"/>
-                <a:cs typeface="Times New Roman" panose="02020603050405020304" pitchFamily="18" charset="0"/>
-              </a:rPr>
-              <a:t>/Unity</a:t>
-            </a:r>
-          </a:p>
-          <a:p>
-            <a:endParaRPr lang="en-US" dirty="0">
-              <a:latin typeface="Times New Roman" panose="02020603050405020304" pitchFamily="18" charset="0"/>
-              <a:cs typeface="Times New Roman" panose="02020603050405020304" pitchFamily="18" charset="0"/>
-            </a:endParaRPr>
-          </a:p>
-          <a:p>
-            <a:r>
-              <a:rPr lang="en-US" dirty="0">
-                <a:latin typeface="Times New Roman" panose="02020603050405020304" pitchFamily="18" charset="0"/>
-                <a:cs typeface="Times New Roman" panose="02020603050405020304" pitchFamily="18" charset="0"/>
-              </a:rPr>
-              <a:t>Port my 2D NDS game project to PC</a:t>
-            </a:r>
-          </a:p>
-          <a:p>
-            <a:endParaRPr lang="en-US" dirty="0">
-              <a:latin typeface="Times New Roman" panose="02020603050405020304" pitchFamily="18" charset="0"/>
-              <a:cs typeface="Times New Roman" panose="02020603050405020304" pitchFamily="18" charset="0"/>
-            </a:endParaRPr>
-          </a:p>
-          <a:p>
-            <a:r>
-              <a:rPr lang="en-US" dirty="0">
-                <a:latin typeface="Times New Roman" panose="02020603050405020304" pitchFamily="18" charset="0"/>
-                <a:cs typeface="Times New Roman" panose="02020603050405020304" pitchFamily="18" charset="0"/>
-              </a:rPr>
-              <a:t>Polish Sophomore game</a:t>
-            </a:r>
-          </a:p>
-        </p:txBody>
-      </p:sp>
-      <p:sp>
-        <p:nvSpPr>
           <p:cNvPr id="5" name="Title 4">
             <a:extLst>
               <a:ext uri="{FF2B5EF4-FFF2-40B4-BE49-F238E27FC236}">
@@ -5858,17 +6247,17 @@
                 <a:latin typeface="Times New Roman" panose="02020603050405020304" pitchFamily="18" charset="0"/>
                 <a:cs typeface="Times New Roman" panose="02020603050405020304" pitchFamily="18" charset="0"/>
               </a:rPr>
-              <a:t>     Fall Back Projects</a:t>
-            </a:r>
-          </a:p>
-        </p:txBody>
-      </p:sp>
-      <p:sp>
-        <p:nvSpPr>
-          <p:cNvPr id="6" name="Content Placeholder 2">
+              <a:t>     Demo</a:t>
+            </a:r>
+          </a:p>
+        </p:txBody>
+      </p:sp>
+      <p:sp>
+        <p:nvSpPr>
+          <p:cNvPr id="7" name="Content Placeholder 2">
             <a:extLst>
               <a:ext uri="{FF2B5EF4-FFF2-40B4-BE49-F238E27FC236}">
-                <a16:creationId xmlns:a16="http://schemas.microsoft.com/office/drawing/2014/main" id="{E30968E5-0E71-4FE3-BE2E-21FAD198318C}"/>
+                <a16:creationId xmlns:a16="http://schemas.microsoft.com/office/drawing/2014/main" id="{C143ACC8-ECB8-4176-A00A-7B3DABA23BB0}"/>
               </a:ext>
             </a:extLst>
           </p:cNvPr>
@@ -6083,7 +6472,7 @@
             </a:pPr>
             <a:r>
               <a:rPr lang="en-US" sz="1400" dirty="0"/>
-              <a:t>© 2017 </a:t>
+              <a:t>© 2018 </a:t>
             </a:r>
             <a:r>
               <a:rPr lang="en-US" sz="1400" dirty="0" err="1"/>
@@ -6131,7 +6520,7 @@
     </p:spTree>
     <p:extLst>
       <p:ext uri="{BB962C8B-B14F-4D97-AF65-F5344CB8AC3E}">
-        <p14:creationId xmlns:p14="http://schemas.microsoft.com/office/powerpoint/2010/main" val="466422294"/>
+        <p14:creationId xmlns:p14="http://schemas.microsoft.com/office/powerpoint/2010/main" val="358668100"/>
       </p:ext>
     </p:extLst>
   </p:cSld>
@@ -6191,39 +6580,102 @@
         <p:spPr>
           <a:xfrm>
             <a:off x="1057523" y="1825625"/>
-            <a:ext cx="7100515" cy="4351338"/>
+            <a:ext cx="7457826" cy="4351338"/>
           </a:xfrm>
         </p:spPr>
         <p:txBody>
-          <a:bodyPr/>
+          <a:bodyPr>
+            <a:normAutofit/>
+          </a:bodyPr>
           <a:lstStyle/>
           <a:p>
-            <a:pPr algn="ctr"/>
+            <a:r>
+              <a:rPr lang="en-US" dirty="0">
+                <a:latin typeface="Times New Roman" panose="02020603050405020304" pitchFamily="18" charset="0"/>
+                <a:cs typeface="Times New Roman" panose="02020603050405020304" pitchFamily="18" charset="0"/>
+              </a:rPr>
+              <a:t>Ghosting (Hardware Issue)</a:t>
+            </a:r>
+          </a:p>
+          <a:p>
             <a:endParaRPr lang="en-US" dirty="0">
               <a:latin typeface="Times New Roman" panose="02020603050405020304" pitchFamily="18" charset="0"/>
               <a:cs typeface="Times New Roman" panose="02020603050405020304" pitchFamily="18" charset="0"/>
             </a:endParaRPr>
           </a:p>
           <a:p>
-            <a:pPr marL="0" indent="0" algn="ctr">
+            <a:r>
+              <a:rPr lang="en-US" dirty="0">
+                <a:latin typeface="Times New Roman" panose="02020603050405020304" pitchFamily="18" charset="0"/>
+                <a:cs typeface="Times New Roman" panose="02020603050405020304" pitchFamily="18" charset="0"/>
+              </a:rPr>
+              <a:t>Different Input implementation per API</a:t>
+            </a:r>
+          </a:p>
+          <a:p>
+            <a:endParaRPr lang="en-US" dirty="0">
+              <a:latin typeface="Times New Roman" panose="02020603050405020304" pitchFamily="18" charset="0"/>
+              <a:cs typeface="Times New Roman" panose="02020603050405020304" pitchFamily="18" charset="0"/>
+            </a:endParaRPr>
+          </a:p>
+          <a:p>
+            <a:r>
+              <a:rPr lang="en-US" dirty="0">
+                <a:latin typeface="Times New Roman" panose="02020603050405020304" pitchFamily="18" charset="0"/>
+                <a:cs typeface="Times New Roman" panose="02020603050405020304" pitchFamily="18" charset="0"/>
+              </a:rPr>
+              <a:t> Getting </a:t>
+            </a:r>
+            <a:r>
+              <a:rPr lang="en-US" dirty="0" err="1">
+                <a:latin typeface="Times New Roman" panose="02020603050405020304" pitchFamily="18" charset="0"/>
+                <a:cs typeface="Times New Roman" panose="02020603050405020304" pitchFamily="18" charset="0"/>
+              </a:rPr>
+              <a:t>ImGui</a:t>
+            </a:r>
+            <a:r>
+              <a:rPr lang="en-US" dirty="0">
+                <a:latin typeface="Times New Roman" panose="02020603050405020304" pitchFamily="18" charset="0"/>
+                <a:cs typeface="Times New Roman" panose="02020603050405020304" pitchFamily="18" charset="0"/>
+              </a:rPr>
+              <a:t> to work right with other API’s </a:t>
+            </a:r>
+          </a:p>
+          <a:p>
+            <a:pPr lvl="1"/>
+            <a:r>
+              <a:rPr lang="en-US" dirty="0">
+                <a:latin typeface="Times New Roman" panose="02020603050405020304" pitchFamily="18" charset="0"/>
+                <a:cs typeface="Times New Roman" panose="02020603050405020304" pitchFamily="18" charset="0"/>
+              </a:rPr>
+              <a:t>SFML</a:t>
+            </a:r>
+          </a:p>
+          <a:p>
+            <a:pPr lvl="1"/>
+            <a:r>
+              <a:rPr lang="en-US" dirty="0">
+                <a:latin typeface="Times New Roman" panose="02020603050405020304" pitchFamily="18" charset="0"/>
+                <a:cs typeface="Times New Roman" panose="02020603050405020304" pitchFamily="18" charset="0"/>
+              </a:rPr>
+              <a:t>Windows API</a:t>
+            </a:r>
+            <a:endParaRPr lang="en-US" dirty="0">
+              <a:solidFill>
+                <a:schemeClr val="bg1"/>
+              </a:solidFill>
+              <a:latin typeface="Times New Roman" panose="02020603050405020304" pitchFamily="18" charset="0"/>
+              <a:cs typeface="Times New Roman" panose="02020603050405020304" pitchFamily="18" charset="0"/>
+            </a:endParaRPr>
+          </a:p>
+          <a:p>
+            <a:pPr marL="457200" lvl="1" indent="0">
               <a:buNone/>
             </a:pPr>
             <a:endParaRPr lang="en-US" dirty="0">
               <a:latin typeface="Times New Roman" panose="02020603050405020304" pitchFamily="18" charset="0"/>
               <a:cs typeface="Times New Roman" panose="02020603050405020304" pitchFamily="18" charset="0"/>
             </a:endParaRPr>
-          </a:p>
-          <a:p>
-            <a:pPr marL="0" indent="0" algn="ctr">
-              <a:buNone/>
-            </a:pPr>
-            <a:r>
-              <a:rPr lang="en-US" sz="4800" dirty="0">
-                <a:latin typeface="Times New Roman" panose="02020603050405020304" pitchFamily="18" charset="0"/>
-                <a:cs typeface="Times New Roman" panose="02020603050405020304" pitchFamily="18" charset="0"/>
-              </a:rPr>
-              <a:t>Questions?</a:t>
-            </a:r>
           </a:p>
         </p:txBody>
       </p:sp>
@@ -6253,17 +6705,17 @@
                 <a:latin typeface="Times New Roman" panose="02020603050405020304" pitchFamily="18" charset="0"/>
                 <a:cs typeface="Times New Roman" panose="02020603050405020304" pitchFamily="18" charset="0"/>
               </a:rPr>
-              <a:t>     </a:t>
-            </a:r>
-          </a:p>
-        </p:txBody>
-      </p:sp>
-      <p:sp>
-        <p:nvSpPr>
-          <p:cNvPr id="6" name="Content Placeholder 2">
+              <a:t>     Known Problems</a:t>
+            </a:r>
+          </a:p>
+        </p:txBody>
+      </p:sp>
+      <p:sp>
+        <p:nvSpPr>
+          <p:cNvPr id="7" name="Content Placeholder 2">
             <a:extLst>
               <a:ext uri="{FF2B5EF4-FFF2-40B4-BE49-F238E27FC236}">
-                <a16:creationId xmlns:a16="http://schemas.microsoft.com/office/drawing/2014/main" id="{E30968E5-0E71-4FE3-BE2E-21FAD198318C}"/>
+                <a16:creationId xmlns:a16="http://schemas.microsoft.com/office/drawing/2014/main" id="{3826BADE-1428-4CA8-B83E-C41B7B3FAA95}"/>
               </a:ext>
             </a:extLst>
           </p:cNvPr>
@@ -6478,7 +6930,7 @@
             </a:pPr>
             <a:r>
               <a:rPr lang="en-US" sz="1400" dirty="0"/>
-              <a:t>© 2017 </a:t>
+              <a:t>© 2018 </a:t>
             </a:r>
             <a:r>
               <a:rPr lang="en-US" sz="1400" dirty="0" err="1"/>
@@ -6523,64 +6975,445 @@
           </a:p>
         </p:txBody>
       </p:sp>
-      <p:sp>
-        <p:nvSpPr>
-          <p:cNvPr id="7" name="Rectangle 6">
+    </p:spTree>
+    <p:extLst>
+      <p:ext uri="{BB962C8B-B14F-4D97-AF65-F5344CB8AC3E}">
+        <p14:creationId xmlns:p14="http://schemas.microsoft.com/office/powerpoint/2010/main" val="2673580118"/>
+      </p:ext>
+    </p:extLst>
+  </p:cSld>
+  <p:clrMapOvr>
+    <a:masterClrMapping/>
+  </p:clrMapOvr>
+</p:sld>
+</file>
+
+<file path=ppt/slides/slide9.xml><?xml version="1.0" encoding="utf-8"?>
+<p:sld xmlns:a="http://schemas.openxmlformats.org/drawingml/2006/main" xmlns:r="http://schemas.openxmlformats.org/officeDocument/2006/relationships" xmlns:p="http://schemas.openxmlformats.org/presentationml/2006/main" show="0">
+  <p:cSld>
+    <p:bg>
+      <p:bgPr>
+        <a:blipFill dpi="0" rotWithShape="1">
+          <a:blip r:embed="rId2">
+            <a:lum/>
+          </a:blip>
+          <a:srcRect/>
+          <a:stretch>
+            <a:fillRect/>
+          </a:stretch>
+        </a:blipFill>
+        <a:effectLst/>
+      </p:bgPr>
+    </p:bg>
+    <p:spTree>
+      <p:nvGrpSpPr>
+        <p:cNvPr id="1" name=""/>
+        <p:cNvGrpSpPr/>
+        <p:nvPr/>
+      </p:nvGrpSpPr>
+      <p:grpSpPr>
+        <a:xfrm>
+          <a:off x="0" y="0"/>
+          <a:ext cx="0" cy="0"/>
+          <a:chOff x="0" y="0"/>
+          <a:chExt cx="0" cy="0"/>
+        </a:xfrm>
+      </p:grpSpPr>
+      <p:sp>
+        <p:nvSpPr>
+          <p:cNvPr id="3" name="Content Placeholder 2">
             <a:extLst>
               <a:ext uri="{FF2B5EF4-FFF2-40B4-BE49-F238E27FC236}">
-                <a16:creationId xmlns:a16="http://schemas.microsoft.com/office/drawing/2014/main" id="{91D4DD41-00DF-4191-8037-5F35FC0A53A6}"/>
+                <a16:creationId xmlns:a16="http://schemas.microsoft.com/office/drawing/2014/main" id="{1C3F54FD-B5BD-4949-A3D3-52AFAACB16BC}"/>
               </a:ext>
             </a:extLst>
           </p:cNvPr>
-          <p:cNvSpPr/>
-          <p:nvPr/>
+          <p:cNvSpPr>
+            <a:spLocks noGrp="1"/>
+          </p:cNvSpPr>
+          <p:nvPr>
+            <p:ph idx="1"/>
+          </p:nvPr>
         </p:nvSpPr>
         <p:spPr>
           <a:xfrm>
-            <a:off x="1335819" y="1431235"/>
-            <a:ext cx="7402664" cy="182880"/>
+            <a:off x="1057523" y="1825625"/>
+            <a:ext cx="7457826" cy="4351338"/>
+          </a:xfrm>
+        </p:spPr>
+        <p:txBody>
+          <a:bodyPr/>
+          <a:lstStyle/>
+          <a:p>
+            <a:r>
+              <a:rPr lang="en-US" dirty="0">
+                <a:latin typeface="Times New Roman" panose="02020603050405020304" pitchFamily="18" charset="0"/>
+                <a:cs typeface="Times New Roman" panose="02020603050405020304" pitchFamily="18" charset="0"/>
+              </a:rPr>
+              <a:t>2.5D generated objects using 2D image stacking</a:t>
+            </a:r>
+          </a:p>
+          <a:p>
+            <a:endParaRPr lang="en-US" dirty="0">
+              <a:latin typeface="Times New Roman" panose="02020603050405020304" pitchFamily="18" charset="0"/>
+              <a:cs typeface="Times New Roman" panose="02020603050405020304" pitchFamily="18" charset="0"/>
+            </a:endParaRPr>
+          </a:p>
+          <a:p>
+            <a:r>
+              <a:rPr lang="en-US" dirty="0">
+                <a:latin typeface="Times New Roman" panose="02020603050405020304" pitchFamily="18" charset="0"/>
+                <a:cs typeface="Times New Roman" panose="02020603050405020304" pitchFamily="18" charset="0"/>
+              </a:rPr>
+              <a:t>Creating a 2D game via </a:t>
+            </a:r>
+            <a:r>
+              <a:rPr lang="en-US" dirty="0" err="1">
+                <a:latin typeface="Times New Roman" panose="02020603050405020304" pitchFamily="18" charset="0"/>
+                <a:cs typeface="Times New Roman" panose="02020603050405020304" pitchFamily="18" charset="0"/>
+              </a:rPr>
+              <a:t>GameMaker</a:t>
+            </a:r>
+            <a:r>
+              <a:rPr lang="en-US" dirty="0">
+                <a:latin typeface="Times New Roman" panose="02020603050405020304" pitchFamily="18" charset="0"/>
+                <a:cs typeface="Times New Roman" panose="02020603050405020304" pitchFamily="18" charset="0"/>
+              </a:rPr>
+              <a:t>/Unity</a:t>
+            </a:r>
+          </a:p>
+          <a:p>
+            <a:endParaRPr lang="en-US" dirty="0">
+              <a:latin typeface="Times New Roman" panose="02020603050405020304" pitchFamily="18" charset="0"/>
+              <a:cs typeface="Times New Roman" panose="02020603050405020304" pitchFamily="18" charset="0"/>
+            </a:endParaRPr>
+          </a:p>
+          <a:p>
+            <a:r>
+              <a:rPr lang="en-US" dirty="0">
+                <a:latin typeface="Times New Roman" panose="02020603050405020304" pitchFamily="18" charset="0"/>
+                <a:cs typeface="Times New Roman" panose="02020603050405020304" pitchFamily="18" charset="0"/>
+              </a:rPr>
+              <a:t>Port my 2D NDS game project to PC</a:t>
+            </a:r>
+          </a:p>
+          <a:p>
+            <a:endParaRPr lang="en-US" dirty="0">
+              <a:latin typeface="Times New Roman" panose="02020603050405020304" pitchFamily="18" charset="0"/>
+              <a:cs typeface="Times New Roman" panose="02020603050405020304" pitchFamily="18" charset="0"/>
+            </a:endParaRPr>
+          </a:p>
+          <a:p>
+            <a:r>
+              <a:rPr lang="en-US" dirty="0">
+                <a:latin typeface="Times New Roman" panose="02020603050405020304" pitchFamily="18" charset="0"/>
+                <a:cs typeface="Times New Roman" panose="02020603050405020304" pitchFamily="18" charset="0"/>
+              </a:rPr>
+              <a:t>Polish Sophomore game</a:t>
+            </a:r>
+          </a:p>
+        </p:txBody>
+      </p:sp>
+      <p:sp>
+        <p:nvSpPr>
+          <p:cNvPr id="5" name="Title 4">
+            <a:extLst>
+              <a:ext uri="{FF2B5EF4-FFF2-40B4-BE49-F238E27FC236}">
+                <a16:creationId xmlns:a16="http://schemas.microsoft.com/office/drawing/2014/main" id="{536DD991-E7AA-443D-9291-BD1F0FDF39DF}"/>
+              </a:ext>
+            </a:extLst>
+          </p:cNvPr>
+          <p:cNvSpPr>
+            <a:spLocks noGrp="1"/>
+          </p:cNvSpPr>
+          <p:nvPr>
+            <p:ph type="title"/>
+          </p:nvPr>
+        </p:nvSpPr>
+        <p:spPr/>
+        <p:txBody>
+          <a:bodyPr/>
+          <a:lstStyle/>
+          <a:p>
+            <a:r>
+              <a:rPr lang="en-US" dirty="0">
+                <a:latin typeface="Times New Roman" panose="02020603050405020304" pitchFamily="18" charset="0"/>
+                <a:cs typeface="Times New Roman" panose="02020603050405020304" pitchFamily="18" charset="0"/>
+              </a:rPr>
+              <a:t>     Fall Back Projects</a:t>
+            </a:r>
+          </a:p>
+        </p:txBody>
+      </p:sp>
+      <p:sp>
+        <p:nvSpPr>
+          <p:cNvPr id="7" name="Content Placeholder 2">
+            <a:extLst>
+              <a:ext uri="{FF2B5EF4-FFF2-40B4-BE49-F238E27FC236}">
+                <a16:creationId xmlns:a16="http://schemas.microsoft.com/office/drawing/2014/main" id="{E4B9557C-F7B6-4115-B7B0-60AD1781930A}"/>
+              </a:ext>
+            </a:extLst>
+          </p:cNvPr>
+          <p:cNvSpPr txBox="1">
+            <a:spLocks/>
+          </p:cNvSpPr>
+          <p:nvPr/>
+        </p:nvSpPr>
+        <p:spPr>
+          <a:xfrm>
+            <a:off x="286247" y="6154309"/>
+            <a:ext cx="8571506" cy="532739"/>
           </a:xfrm>
           <a:prstGeom prst="rect">
             <a:avLst/>
           </a:prstGeom>
-          <a:solidFill>
-            <a:schemeClr val="bg1"/>
-          </a:solidFill>
-          <a:ln>
-            <a:solidFill>
-              <a:schemeClr val="bg1"/>
-            </a:solidFill>
-          </a:ln>
         </p:spPr>
-        <p:style>
-          <a:lnRef idx="2">
-            <a:schemeClr val="accent1">
-              <a:shade val="50000"/>
-            </a:schemeClr>
-          </a:lnRef>
-          <a:fillRef idx="1">
-            <a:schemeClr val="accent1"/>
-          </a:fillRef>
-          <a:effectRef idx="0">
-            <a:schemeClr val="accent1"/>
-          </a:effectRef>
-          <a:fontRef idx="minor">
-            <a:schemeClr val="lt1"/>
-          </a:fontRef>
-        </p:style>
-        <p:txBody>
-          <a:bodyPr rtlCol="0" anchor="ctr"/>
-          <a:lstStyle/>
-          <a:p>
-            <a:pPr algn="ctr"/>
-            <a:endParaRPr lang="en-US"/>
+        <p:txBody>
+          <a:bodyPr vert="horz" lIns="91440" tIns="45720" rIns="91440" bIns="45720" numCol="2" rtlCol="0">
+            <a:noAutofit/>
+          </a:bodyPr>
+          <a:lstStyle>
+            <a:lvl1pPr marL="228600" indent="-228600" algn="l" defTabSz="914400" rtl="0" eaLnBrk="1" latinLnBrk="0" hangingPunct="1">
+              <a:lnSpc>
+                <a:spcPct val="90000"/>
+              </a:lnSpc>
+              <a:spcBef>
+                <a:spcPts val="1000"/>
+              </a:spcBef>
+              <a:buFont typeface="Arial" panose="020B0604020202020204" pitchFamily="34" charset="0"/>
+              <a:buChar char="•"/>
+              <a:defRPr sz="2800" kern="1200">
+                <a:solidFill>
+                  <a:schemeClr val="tx1"/>
+                </a:solidFill>
+                <a:latin typeface="+mn-lt"/>
+                <a:ea typeface="+mn-ea"/>
+                <a:cs typeface="+mn-cs"/>
+              </a:defRPr>
+            </a:lvl1pPr>
+            <a:lvl2pPr marL="685800" indent="-228600" algn="l" defTabSz="914400" rtl="0" eaLnBrk="1" latinLnBrk="0" hangingPunct="1">
+              <a:lnSpc>
+                <a:spcPct val="90000"/>
+              </a:lnSpc>
+              <a:spcBef>
+                <a:spcPts val="500"/>
+              </a:spcBef>
+              <a:buFont typeface="Arial" panose="020B0604020202020204" pitchFamily="34" charset="0"/>
+              <a:buChar char="•"/>
+              <a:defRPr sz="2400" kern="1200">
+                <a:solidFill>
+                  <a:schemeClr val="tx1"/>
+                </a:solidFill>
+                <a:latin typeface="+mn-lt"/>
+                <a:ea typeface="+mn-ea"/>
+                <a:cs typeface="+mn-cs"/>
+              </a:defRPr>
+            </a:lvl2pPr>
+            <a:lvl3pPr marL="1143000" indent="-228600" algn="l" defTabSz="914400" rtl="0" eaLnBrk="1" latinLnBrk="0" hangingPunct="1">
+              <a:lnSpc>
+                <a:spcPct val="90000"/>
+              </a:lnSpc>
+              <a:spcBef>
+                <a:spcPts val="500"/>
+              </a:spcBef>
+              <a:buFont typeface="Arial" panose="020B0604020202020204" pitchFamily="34" charset="0"/>
+              <a:buChar char="•"/>
+              <a:defRPr sz="2000" kern="1200">
+                <a:solidFill>
+                  <a:schemeClr val="tx1"/>
+                </a:solidFill>
+                <a:latin typeface="+mn-lt"/>
+                <a:ea typeface="+mn-ea"/>
+                <a:cs typeface="+mn-cs"/>
+              </a:defRPr>
+            </a:lvl3pPr>
+            <a:lvl4pPr marL="1600200" indent="-228600" algn="l" defTabSz="914400" rtl="0" eaLnBrk="1" latinLnBrk="0" hangingPunct="1">
+              <a:lnSpc>
+                <a:spcPct val="90000"/>
+              </a:lnSpc>
+              <a:spcBef>
+                <a:spcPts val="500"/>
+              </a:spcBef>
+              <a:buFont typeface="Arial" panose="020B0604020202020204" pitchFamily="34" charset="0"/>
+              <a:buChar char="•"/>
+              <a:defRPr sz="1800" kern="1200">
+                <a:solidFill>
+                  <a:schemeClr val="tx1"/>
+                </a:solidFill>
+                <a:latin typeface="+mn-lt"/>
+                <a:ea typeface="+mn-ea"/>
+                <a:cs typeface="+mn-cs"/>
+              </a:defRPr>
+            </a:lvl4pPr>
+            <a:lvl5pPr marL="2057400" indent="-228600" algn="l" defTabSz="914400" rtl="0" eaLnBrk="1" latinLnBrk="0" hangingPunct="1">
+              <a:lnSpc>
+                <a:spcPct val="90000"/>
+              </a:lnSpc>
+              <a:spcBef>
+                <a:spcPts val="500"/>
+              </a:spcBef>
+              <a:buFont typeface="Arial" panose="020B0604020202020204" pitchFamily="34" charset="0"/>
+              <a:buChar char="•"/>
+              <a:defRPr sz="1800" kern="1200">
+                <a:solidFill>
+                  <a:schemeClr val="tx1"/>
+                </a:solidFill>
+                <a:latin typeface="+mn-lt"/>
+                <a:ea typeface="+mn-ea"/>
+                <a:cs typeface="+mn-cs"/>
+              </a:defRPr>
+            </a:lvl5pPr>
+            <a:lvl6pPr marL="2514600" indent="-228600" algn="l" defTabSz="914400" rtl="0" eaLnBrk="1" latinLnBrk="0" hangingPunct="1">
+              <a:lnSpc>
+                <a:spcPct val="90000"/>
+              </a:lnSpc>
+              <a:spcBef>
+                <a:spcPts val="500"/>
+              </a:spcBef>
+              <a:buFont typeface="Arial" panose="020B0604020202020204" pitchFamily="34" charset="0"/>
+              <a:buChar char="•"/>
+              <a:defRPr sz="1800" kern="1200">
+                <a:solidFill>
+                  <a:schemeClr val="tx1"/>
+                </a:solidFill>
+                <a:latin typeface="+mn-lt"/>
+                <a:ea typeface="+mn-ea"/>
+                <a:cs typeface="+mn-cs"/>
+              </a:defRPr>
+            </a:lvl6pPr>
+            <a:lvl7pPr marL="2971800" indent="-228600" algn="l" defTabSz="914400" rtl="0" eaLnBrk="1" latinLnBrk="0" hangingPunct="1">
+              <a:lnSpc>
+                <a:spcPct val="90000"/>
+              </a:lnSpc>
+              <a:spcBef>
+                <a:spcPts val="500"/>
+              </a:spcBef>
+              <a:buFont typeface="Arial" panose="020B0604020202020204" pitchFamily="34" charset="0"/>
+              <a:buChar char="•"/>
+              <a:defRPr sz="1800" kern="1200">
+                <a:solidFill>
+                  <a:schemeClr val="tx1"/>
+                </a:solidFill>
+                <a:latin typeface="+mn-lt"/>
+                <a:ea typeface="+mn-ea"/>
+                <a:cs typeface="+mn-cs"/>
+              </a:defRPr>
+            </a:lvl7pPr>
+            <a:lvl8pPr marL="3429000" indent="-228600" algn="l" defTabSz="914400" rtl="0" eaLnBrk="1" latinLnBrk="0" hangingPunct="1">
+              <a:lnSpc>
+                <a:spcPct val="90000"/>
+              </a:lnSpc>
+              <a:spcBef>
+                <a:spcPts val="500"/>
+              </a:spcBef>
+              <a:buFont typeface="Arial" panose="020B0604020202020204" pitchFamily="34" charset="0"/>
+              <a:buChar char="•"/>
+              <a:defRPr sz="1800" kern="1200">
+                <a:solidFill>
+                  <a:schemeClr val="tx1"/>
+                </a:solidFill>
+                <a:latin typeface="+mn-lt"/>
+                <a:ea typeface="+mn-ea"/>
+                <a:cs typeface="+mn-cs"/>
+              </a:defRPr>
+            </a:lvl8pPr>
+            <a:lvl9pPr marL="3886200" indent="-228600" algn="l" defTabSz="914400" rtl="0" eaLnBrk="1" latinLnBrk="0" hangingPunct="1">
+              <a:lnSpc>
+                <a:spcPct val="90000"/>
+              </a:lnSpc>
+              <a:spcBef>
+                <a:spcPts val="500"/>
+              </a:spcBef>
+              <a:buFont typeface="Arial" panose="020B0604020202020204" pitchFamily="34" charset="0"/>
+              <a:buChar char="•"/>
+              <a:defRPr sz="1800" kern="1200">
+                <a:solidFill>
+                  <a:schemeClr val="tx1"/>
+                </a:solidFill>
+                <a:latin typeface="+mn-lt"/>
+                <a:ea typeface="+mn-ea"/>
+                <a:cs typeface="+mn-cs"/>
+              </a:defRPr>
+            </a:lvl9pPr>
+          </a:lstStyle>
+          <a:p>
+            <a:pPr marL="0" indent="0">
+              <a:lnSpc>
+                <a:spcPct val="100000"/>
+              </a:lnSpc>
+              <a:spcBef>
+                <a:spcPts val="0"/>
+              </a:spcBef>
+              <a:buFont typeface="Arial" panose="020B0604020202020204" pitchFamily="34" charset="0"/>
+              <a:buNone/>
+            </a:pPr>
+            <a:r>
+              <a:rPr lang="en-US" sz="1400" dirty="0"/>
+              <a:t>GAM400 Milestone 1</a:t>
+            </a:r>
+          </a:p>
+          <a:p>
+            <a:pPr marL="0" indent="0">
+              <a:lnSpc>
+                <a:spcPct val="100000"/>
+              </a:lnSpc>
+              <a:spcBef>
+                <a:spcPts val="0"/>
+              </a:spcBef>
+              <a:buFont typeface="Arial" panose="020B0604020202020204" pitchFamily="34" charset="0"/>
+              <a:buNone/>
+            </a:pPr>
+            <a:r>
+              <a:rPr lang="en-US" sz="1400" dirty="0"/>
+              <a:t>© 2018 </a:t>
+            </a:r>
+            <a:r>
+              <a:rPr lang="en-US" sz="1400" dirty="0" err="1"/>
+              <a:t>DigiPen</a:t>
+            </a:r>
+            <a:r>
+              <a:rPr lang="en-US" sz="1400" dirty="0"/>
+              <a:t> (USA) Corporation</a:t>
+            </a:r>
+          </a:p>
+          <a:p>
+            <a:pPr marL="0" indent="0" algn="r">
+              <a:lnSpc>
+                <a:spcPct val="100000"/>
+              </a:lnSpc>
+              <a:spcBef>
+                <a:spcPts val="0"/>
+              </a:spcBef>
+              <a:buFont typeface="Arial" panose="020B0604020202020204" pitchFamily="34" charset="0"/>
+              <a:buNone/>
+            </a:pPr>
+            <a:r>
+              <a:rPr lang="en-US" sz="1400" dirty="0"/>
+              <a:t>Instructor: Jen Sward</a:t>
+            </a:r>
+          </a:p>
+          <a:p>
+            <a:pPr marL="0" indent="0" algn="r">
+              <a:lnSpc>
+                <a:spcPct val="100000"/>
+              </a:lnSpc>
+              <a:spcBef>
+                <a:spcPts val="0"/>
+              </a:spcBef>
+              <a:buFont typeface="Arial" panose="020B0604020202020204" pitchFamily="34" charset="0"/>
+              <a:buNone/>
+            </a:pPr>
+            <a:r>
+              <a:rPr lang="en-US" sz="1400" dirty="0"/>
+              <a:t>By: James Schmidt</a:t>
+            </a:r>
           </a:p>
         </p:txBody>
       </p:sp>
     </p:spTree>
     <p:extLst>
       <p:ext uri="{BB962C8B-B14F-4D97-AF65-F5344CB8AC3E}">
-        <p14:creationId xmlns:p14="http://schemas.microsoft.com/office/powerpoint/2010/main" val="3927511870"/>
+        <p14:creationId xmlns:p14="http://schemas.microsoft.com/office/powerpoint/2010/main" val="466422294"/>
       </p:ext>
     </p:extLst>
   </p:cSld>

</xml_diff>